<commit_message>
made week 7 powerpoint
</commit_message>
<xml_diff>
--- a/Weekly Presentations/Week 7.pptx
+++ b/Weekly Presentations/Week 7.pptx
@@ -7,10 +7,11 @@
   <p:sldIdLst>
     <p:sldId id="256" r:id="rId2"/>
     <p:sldId id="257" r:id="rId3"/>
-    <p:sldId id="258" r:id="rId4"/>
-    <p:sldId id="259" r:id="rId5"/>
-    <p:sldId id="260" r:id="rId6"/>
-    <p:sldId id="261" r:id="rId7"/>
+    <p:sldId id="262" r:id="rId4"/>
+    <p:sldId id="258" r:id="rId5"/>
+    <p:sldId id="259" r:id="rId6"/>
+    <p:sldId id="260" r:id="rId7"/>
+    <p:sldId id="261" r:id="rId8"/>
   </p:sldIdLst>
   <p:sldSz cx="12192000" cy="6858000"/>
   <p:notesSz cx="6858000" cy="9144000"/>
@@ -109,6 +110,11 @@
       </a:defRPr>
     </a:lvl9pPr>
   </p:defaultTextStyle>
+  <p:extLst>
+    <p:ext uri="{EFAFB233-063F-42B5-8137-9DF3F51BA10A}">
+      <p15:sldGuideLst xmlns:p15="http://schemas.microsoft.com/office/powerpoint/2012/main"/>
+    </p:ext>
+  </p:extLst>
 </p:presentation>
 </file>
 
@@ -259,7 +265,7 @@
           <a:p>
             <a:fld id="{691666CB-76B6-664D-9487-F1496474E9C0}" type="datetimeFigureOut">
               <a:rPr lang="en-US" smtClean="0"/>
-              <a:t>10/14/20</a:t>
+              <a:t>10/15/20</a:t>
             </a:fld>
             <a:endParaRPr lang="en-US"/>
           </a:p>
@@ -457,7 +463,7 @@
           <a:p>
             <a:fld id="{691666CB-76B6-664D-9487-F1496474E9C0}" type="datetimeFigureOut">
               <a:rPr lang="en-US" smtClean="0"/>
-              <a:t>10/14/20</a:t>
+              <a:t>10/15/20</a:t>
             </a:fld>
             <a:endParaRPr lang="en-US"/>
           </a:p>
@@ -665,7 +671,7 @@
           <a:p>
             <a:fld id="{691666CB-76B6-664D-9487-F1496474E9C0}" type="datetimeFigureOut">
               <a:rPr lang="en-US" smtClean="0"/>
-              <a:t>10/14/20</a:t>
+              <a:t>10/15/20</a:t>
             </a:fld>
             <a:endParaRPr lang="en-US"/>
           </a:p>
@@ -863,7 +869,7 @@
           <a:p>
             <a:fld id="{691666CB-76B6-664D-9487-F1496474E9C0}" type="datetimeFigureOut">
               <a:rPr lang="en-US" smtClean="0"/>
-              <a:t>10/14/20</a:t>
+              <a:t>10/15/20</a:t>
             </a:fld>
             <a:endParaRPr lang="en-US"/>
           </a:p>
@@ -1138,7 +1144,7 @@
           <a:p>
             <a:fld id="{691666CB-76B6-664D-9487-F1496474E9C0}" type="datetimeFigureOut">
               <a:rPr lang="en-US" smtClean="0"/>
-              <a:t>10/14/20</a:t>
+              <a:t>10/15/20</a:t>
             </a:fld>
             <a:endParaRPr lang="en-US"/>
           </a:p>
@@ -1403,7 +1409,7 @@
           <a:p>
             <a:fld id="{691666CB-76B6-664D-9487-F1496474E9C0}" type="datetimeFigureOut">
               <a:rPr lang="en-US" smtClean="0"/>
-              <a:t>10/14/20</a:t>
+              <a:t>10/15/20</a:t>
             </a:fld>
             <a:endParaRPr lang="en-US"/>
           </a:p>
@@ -1815,7 +1821,7 @@
           <a:p>
             <a:fld id="{691666CB-76B6-664D-9487-F1496474E9C0}" type="datetimeFigureOut">
               <a:rPr lang="en-US" smtClean="0"/>
-              <a:t>10/14/20</a:t>
+              <a:t>10/15/20</a:t>
             </a:fld>
             <a:endParaRPr lang="en-US"/>
           </a:p>
@@ -1956,7 +1962,7 @@
           <a:p>
             <a:fld id="{691666CB-76B6-664D-9487-F1496474E9C0}" type="datetimeFigureOut">
               <a:rPr lang="en-US" smtClean="0"/>
-              <a:t>10/14/20</a:t>
+              <a:t>10/15/20</a:t>
             </a:fld>
             <a:endParaRPr lang="en-US"/>
           </a:p>
@@ -2069,7 +2075,7 @@
           <a:p>
             <a:fld id="{691666CB-76B6-664D-9487-F1496474E9C0}" type="datetimeFigureOut">
               <a:rPr lang="en-US" smtClean="0"/>
-              <a:t>10/14/20</a:t>
+              <a:t>10/15/20</a:t>
             </a:fld>
             <a:endParaRPr lang="en-US"/>
           </a:p>
@@ -2380,7 +2386,7 @@
           <a:p>
             <a:fld id="{691666CB-76B6-664D-9487-F1496474E9C0}" type="datetimeFigureOut">
               <a:rPr lang="en-US" smtClean="0"/>
-              <a:t>10/14/20</a:t>
+              <a:t>10/15/20</a:t>
             </a:fld>
             <a:endParaRPr lang="en-US"/>
           </a:p>
@@ -2668,7 +2674,7 @@
           <a:p>
             <a:fld id="{691666CB-76B6-664D-9487-F1496474E9C0}" type="datetimeFigureOut">
               <a:rPr lang="en-US" smtClean="0"/>
-              <a:t>10/14/20</a:t>
+              <a:t>10/15/20</a:t>
             </a:fld>
             <a:endParaRPr lang="en-US"/>
           </a:p>
@@ -2909,7 +2915,7 @@
           <a:p>
             <a:fld id="{691666CB-76B6-664D-9487-F1496474E9C0}" type="datetimeFigureOut">
               <a:rPr lang="en-US" smtClean="0"/>
-              <a:t>10/14/20</a:t>
+              <a:t>10/15/20</a:t>
             </a:fld>
             <a:endParaRPr lang="en-US"/>
           </a:p>
@@ -3461,7 +3467,39 @@
           <a:bodyPr/>
           <a:lstStyle/>
           <a:p>
-            <a:endParaRPr lang="en-US"/>
+            <a:r>
+              <a:rPr lang="en-US" dirty="0"/>
+              <a:t>Ran </a:t>
+            </a:r>
+            <a:r>
+              <a:rPr lang="en-US" dirty="0" err="1"/>
+              <a:t>monte_carlo.py</a:t>
+            </a:r>
+            <a:r>
+              <a:rPr lang="en-US" dirty="0"/>
+              <a:t> to find the optimal angle for a 2D two-point backboard</a:t>
+            </a:r>
+          </a:p>
+          <a:p>
+            <a:pPr lvl="1"/>
+            <a:r>
+              <a:rPr lang="en-US" dirty="0"/>
+              <a:t>Ran it three times for 1000 simulations and got three different results: 1.3776532591487067, 1.507551763453968, 1.5195559981438695</a:t>
+            </a:r>
+          </a:p>
+          <a:p>
+            <a:pPr lvl="1"/>
+            <a:r>
+              <a:rPr lang="en-US" dirty="0"/>
+              <a:t>Since these results differed, I decided to run it for 10000 simulations. This has been running for 5 days :/</a:t>
+            </a:r>
+          </a:p>
+          <a:p>
+            <a:pPr lvl="1"/>
+            <a:r>
+              <a:rPr lang="en-US" dirty="0"/>
+              <a:t>Instead of running it for a set number of simulations, I decided to change it to run until the number of shots that hits the backboard exceeds a certain number. This way I can get a better sense of how many of the simulations are actually significant. (This code was still running Thursday night when I made the presentation)</a:t>
+            </a:r>
           </a:p>
         </p:txBody>
       </p:sp>
@@ -3500,7 +3538,7 @@
           <p:cNvPr id="2" name="Title 1">
             <a:extLst>
               <a:ext uri="{FF2B5EF4-FFF2-40B4-BE49-F238E27FC236}">
-                <a16:creationId xmlns:a16="http://schemas.microsoft.com/office/drawing/2014/main" id="{9A78E545-E3F6-C34E-85B7-101354120095}"/>
+                <a16:creationId xmlns:a16="http://schemas.microsoft.com/office/drawing/2014/main" id="{4A2A16D2-1B62-3746-9C0F-71AB913E4AF4}"/>
               </a:ext>
             </a:extLst>
           </p:cNvPr>
@@ -3518,7 +3556,7 @@
           <a:p>
             <a:r>
               <a:rPr lang="en-US" dirty="0"/>
-              <a:t>What Worked</a:t>
+              <a:t>What I’ve Done</a:t>
             </a:r>
           </a:p>
         </p:txBody>
@@ -3528,7 +3566,7 @@
           <p:cNvPr id="3" name="Content Placeholder 2">
             <a:extLst>
               <a:ext uri="{FF2B5EF4-FFF2-40B4-BE49-F238E27FC236}">
-                <a16:creationId xmlns:a16="http://schemas.microsoft.com/office/drawing/2014/main" id="{082F1C2D-8825-4D49-B163-6CBF6BDE009F}"/>
+                <a16:creationId xmlns:a16="http://schemas.microsoft.com/office/drawing/2014/main" id="{C92C398E-50D6-0646-8901-0D6DAF64B4E7}"/>
               </a:ext>
             </a:extLst>
           </p:cNvPr>
@@ -3539,19 +3577,87 @@
             <p:ph idx="1"/>
           </p:nvPr>
         </p:nvSpPr>
-        <p:spPr/>
-        <p:txBody>
-          <a:bodyPr/>
-          <a:lstStyle/>
-          <a:p>
-            <a:endParaRPr lang="en-US"/>
-          </a:p>
-        </p:txBody>
-      </p:sp>
+        <p:spPr>
+          <a:xfrm>
+            <a:off x="838199" y="1825625"/>
+            <a:ext cx="10515599" cy="4351338"/>
+          </a:xfrm>
+        </p:spPr>
+        <p:txBody>
+          <a:bodyPr>
+            <a:normAutofit lnSpcReduction="10000"/>
+          </a:bodyPr>
+          <a:lstStyle/>
+          <a:p>
+            <a:r>
+              <a:rPr lang="en-US" dirty="0"/>
+              <a:t>Created a function called </a:t>
+            </a:r>
+            <a:r>
+              <a:rPr lang="en-US" dirty="0" err="1"/>
+              <a:t>move_points</a:t>
+            </a:r>
+            <a:r>
+              <a:rPr lang="en-US" dirty="0"/>
+              <a:t> that splits the z range into n segments, finds the optimal angle for each of those segments based on a fixed bottom point and adds them together (explain this more)</a:t>
+            </a:r>
+          </a:p>
+          <a:p>
+            <a:pPr lvl="1"/>
+            <a:r>
+              <a:rPr lang="en-US" dirty="0"/>
+              <a:t>The full version of this was still running Thursday night but I hard coded an example into it. This wasn’t a very good example because only one shot was used so it was hard to compare the best angle for just that one shot – gave a wrong result. I also tried to add a condition that redoes the optimization if the y value is greater than 2 in absolute value to avoid outliers like this.</a:t>
+            </a:r>
+          </a:p>
+          <a:p>
+            <a:pPr lvl="1"/>
+            <a:r>
+              <a:rPr lang="en-US" dirty="0"/>
+              <a:t>Hopefully this will extend well to more angle points</a:t>
+            </a:r>
+          </a:p>
+          <a:p>
+            <a:pPr lvl="1"/>
+            <a:r>
+              <a:rPr lang="en-US" dirty="0"/>
+              <a:t>The three point code was running for 2 days so I’m not sure if there’s a more effective way to do it that won’t take as long because for the actual backboard we’ll need a ton of points </a:t>
+            </a:r>
+          </a:p>
+        </p:txBody>
+      </p:sp>
+      <p:pic>
+        <p:nvPicPr>
+          <p:cNvPr id="6" name="Picture 5" descr="Chart, line chart&#10;&#10;Description automatically generated">
+            <a:extLst>
+              <a:ext uri="{FF2B5EF4-FFF2-40B4-BE49-F238E27FC236}">
+                <a16:creationId xmlns:a16="http://schemas.microsoft.com/office/drawing/2014/main" id="{8DCEF1A7-1DD2-3D46-B5D0-950218F61852}"/>
+              </a:ext>
+            </a:extLst>
+          </p:cNvPr>
+          <p:cNvPicPr>
+            <a:picLocks noChangeAspect="1"/>
+          </p:cNvPicPr>
+          <p:nvPr/>
+        </p:nvPicPr>
+        <p:blipFill rotWithShape="1">
+          <a:blip r:embed="rId2"/>
+          <a:srcRect t="32660" b="32197"/>
+          <a:stretch/>
+        </p:blipFill>
+        <p:spPr>
+          <a:xfrm>
+            <a:off x="7015480" y="0"/>
+            <a:ext cx="5176520" cy="1325563"/>
+          </a:xfrm>
+          <a:prstGeom prst="rect">
+            <a:avLst/>
+          </a:prstGeom>
+        </p:spPr>
+      </p:pic>
     </p:spTree>
     <p:extLst>
       <p:ext uri="{BB962C8B-B14F-4D97-AF65-F5344CB8AC3E}">
-        <p14:creationId xmlns:p14="http://schemas.microsoft.com/office/powerpoint/2010/main" val="2634067747"/>
+        <p14:creationId xmlns:p14="http://schemas.microsoft.com/office/powerpoint/2010/main" val="3770338653"/>
       </p:ext>
     </p:extLst>
   </p:cSld>
@@ -3583,7 +3689,7 @@
           <p:cNvPr id="2" name="Title 1">
             <a:extLst>
               <a:ext uri="{FF2B5EF4-FFF2-40B4-BE49-F238E27FC236}">
-                <a16:creationId xmlns:a16="http://schemas.microsoft.com/office/drawing/2014/main" id="{44F33B7D-6905-1546-9F37-9EA83E2C175F}"/>
+                <a16:creationId xmlns:a16="http://schemas.microsoft.com/office/drawing/2014/main" id="{9A78E545-E3F6-C34E-85B7-101354120095}"/>
               </a:ext>
             </a:extLst>
           </p:cNvPr>
@@ -3601,7 +3707,7 @@
           <a:p>
             <a:r>
               <a:rPr lang="en-US" dirty="0"/>
-              <a:t>What Didn’t Work</a:t>
+              <a:t>What Worked</a:t>
             </a:r>
           </a:p>
         </p:txBody>
@@ -3611,7 +3717,7 @@
           <p:cNvPr id="3" name="Content Placeholder 2">
             <a:extLst>
               <a:ext uri="{FF2B5EF4-FFF2-40B4-BE49-F238E27FC236}">
-                <a16:creationId xmlns:a16="http://schemas.microsoft.com/office/drawing/2014/main" id="{3F29ECB1-0FE0-BF4B-9DDD-C21D22F50902}"/>
+                <a16:creationId xmlns:a16="http://schemas.microsoft.com/office/drawing/2014/main" id="{082F1C2D-8825-4D49-B163-6CBF6BDE009F}"/>
               </a:ext>
             </a:extLst>
           </p:cNvPr>
@@ -3627,14 +3733,23 @@
           <a:bodyPr/>
           <a:lstStyle/>
           <a:p>
-            <a:endParaRPr lang="en-US"/>
+            <a:r>
+              <a:rPr lang="en-US" dirty="0"/>
+              <a:t>I now get email notifications whenever a job finishes (still not working for when there’s an error but I’ve been consistently checking in case there’s an error)</a:t>
+            </a:r>
+          </a:p>
+          <a:p>
+            <a:r>
+              <a:rPr lang="en-US" dirty="0"/>
+              <a:t>In submitting a job and also changing small things in the file I got several small errors that I was able to fix</a:t>
+            </a:r>
           </a:p>
         </p:txBody>
       </p:sp>
     </p:spTree>
     <p:extLst>
       <p:ext uri="{BB962C8B-B14F-4D97-AF65-F5344CB8AC3E}">
-        <p14:creationId xmlns:p14="http://schemas.microsoft.com/office/powerpoint/2010/main" val="3380320477"/>
+        <p14:creationId xmlns:p14="http://schemas.microsoft.com/office/powerpoint/2010/main" val="2634067747"/>
       </p:ext>
     </p:extLst>
   </p:cSld>
@@ -3666,7 +3781,7 @@
           <p:cNvPr id="2" name="Title 1">
             <a:extLst>
               <a:ext uri="{FF2B5EF4-FFF2-40B4-BE49-F238E27FC236}">
-                <a16:creationId xmlns:a16="http://schemas.microsoft.com/office/drawing/2014/main" id="{D9446744-C0B4-A543-A6BB-7D55B5AB27D5}"/>
+                <a16:creationId xmlns:a16="http://schemas.microsoft.com/office/drawing/2014/main" id="{44F33B7D-6905-1546-9F37-9EA83E2C175F}"/>
               </a:ext>
             </a:extLst>
           </p:cNvPr>
@@ -3684,7 +3799,7 @@
           <a:p>
             <a:r>
               <a:rPr lang="en-US" dirty="0"/>
-              <a:t>Where am I Stuck?</a:t>
+              <a:t>What Didn’t Work</a:t>
             </a:r>
           </a:p>
         </p:txBody>
@@ -3694,7 +3809,7 @@
           <p:cNvPr id="3" name="Content Placeholder 2">
             <a:extLst>
               <a:ext uri="{FF2B5EF4-FFF2-40B4-BE49-F238E27FC236}">
-                <a16:creationId xmlns:a16="http://schemas.microsoft.com/office/drawing/2014/main" id="{907DBE10-5AE2-5841-A72A-E34EE702B4B6}"/>
+                <a16:creationId xmlns:a16="http://schemas.microsoft.com/office/drawing/2014/main" id="{3F29ECB1-0FE0-BF4B-9DDD-C21D22F50902}"/>
               </a:ext>
             </a:extLst>
           </p:cNvPr>
@@ -3710,14 +3825,17 @@
           <a:bodyPr/>
           <a:lstStyle/>
           <a:p>
-            <a:endParaRPr lang="en-US"/>
+            <a:r>
+              <a:rPr lang="en-US" dirty="0"/>
+              <a:t>Code is taking so long to run</a:t>
+            </a:r>
           </a:p>
         </p:txBody>
       </p:sp>
     </p:spTree>
     <p:extLst>
       <p:ext uri="{BB962C8B-B14F-4D97-AF65-F5344CB8AC3E}">
-        <p14:creationId xmlns:p14="http://schemas.microsoft.com/office/powerpoint/2010/main" val="905092252"/>
+        <p14:creationId xmlns:p14="http://schemas.microsoft.com/office/powerpoint/2010/main" val="3380320477"/>
       </p:ext>
     </p:extLst>
   </p:cSld>
@@ -3749,6 +3867,114 @@
           <p:cNvPr id="2" name="Title 1">
             <a:extLst>
               <a:ext uri="{FF2B5EF4-FFF2-40B4-BE49-F238E27FC236}">
+                <a16:creationId xmlns:a16="http://schemas.microsoft.com/office/drawing/2014/main" id="{D9446744-C0B4-A543-A6BB-7D55B5AB27D5}"/>
+              </a:ext>
+            </a:extLst>
+          </p:cNvPr>
+          <p:cNvSpPr>
+            <a:spLocks noGrp="1"/>
+          </p:cNvSpPr>
+          <p:nvPr>
+            <p:ph type="title"/>
+          </p:nvPr>
+        </p:nvSpPr>
+        <p:spPr/>
+        <p:txBody>
+          <a:bodyPr/>
+          <a:lstStyle/>
+          <a:p>
+            <a:r>
+              <a:rPr lang="en-US" dirty="0"/>
+              <a:t>Where am I Stuck?</a:t>
+            </a:r>
+          </a:p>
+        </p:txBody>
+      </p:sp>
+      <p:sp>
+        <p:nvSpPr>
+          <p:cNvPr id="3" name="Content Placeholder 2">
+            <a:extLst>
+              <a:ext uri="{FF2B5EF4-FFF2-40B4-BE49-F238E27FC236}">
+                <a16:creationId xmlns:a16="http://schemas.microsoft.com/office/drawing/2014/main" id="{907DBE10-5AE2-5841-A72A-E34EE702B4B6}"/>
+              </a:ext>
+            </a:extLst>
+          </p:cNvPr>
+          <p:cNvSpPr>
+            <a:spLocks noGrp="1"/>
+          </p:cNvSpPr>
+          <p:nvPr>
+            <p:ph idx="1"/>
+          </p:nvPr>
+        </p:nvSpPr>
+        <p:spPr/>
+        <p:txBody>
+          <a:bodyPr/>
+          <a:lstStyle/>
+          <a:p>
+            <a:r>
+              <a:rPr lang="en-US" dirty="0"/>
+              <a:t>Walk through </a:t>
+            </a:r>
+            <a:r>
+              <a:rPr lang="en-US" dirty="0" err="1"/>
+              <a:t>move_points</a:t>
+            </a:r>
+            <a:r>
+              <a:rPr lang="en-US" dirty="0"/>
+              <a:t> function to see if logic makes sense</a:t>
+            </a:r>
+          </a:p>
+          <a:p>
+            <a:r>
+              <a:rPr lang="en-US" dirty="0"/>
+              <a:t>Is there a more efficient way to do the </a:t>
+            </a:r>
+            <a:r>
+              <a:rPr lang="en-US" dirty="0" err="1"/>
+              <a:t>move_points</a:t>
+            </a:r>
+            <a:r>
+              <a:rPr lang="en-US" dirty="0"/>
+              <a:t> function?</a:t>
+            </a:r>
+          </a:p>
+        </p:txBody>
+      </p:sp>
+    </p:spTree>
+    <p:extLst>
+      <p:ext uri="{BB962C8B-B14F-4D97-AF65-F5344CB8AC3E}">
+        <p14:creationId xmlns:p14="http://schemas.microsoft.com/office/powerpoint/2010/main" val="905092252"/>
+      </p:ext>
+    </p:extLst>
+  </p:cSld>
+  <p:clrMapOvr>
+    <a:masterClrMapping/>
+  </p:clrMapOvr>
+</p:sld>
+</file>
+
+<file path=ppt/slides/slide7.xml><?xml version="1.0" encoding="utf-8"?>
+<p:sld xmlns:a="http://schemas.openxmlformats.org/drawingml/2006/main" xmlns:r="http://schemas.openxmlformats.org/officeDocument/2006/relationships" xmlns:p="http://schemas.openxmlformats.org/presentationml/2006/main">
+  <p:cSld>
+    <p:spTree>
+      <p:nvGrpSpPr>
+        <p:cNvPr id="1" name=""/>
+        <p:cNvGrpSpPr/>
+        <p:nvPr/>
+      </p:nvGrpSpPr>
+      <p:grpSpPr>
+        <a:xfrm>
+          <a:off x="0" y="0"/>
+          <a:ext cx="0" cy="0"/>
+          <a:chOff x="0" y="0"/>
+          <a:chExt cx="0" cy="0"/>
+        </a:xfrm>
+      </p:grpSpPr>
+      <p:sp>
+        <p:nvSpPr>
+          <p:cNvPr id="2" name="Title 1">
+            <a:extLst>
+              <a:ext uri="{FF2B5EF4-FFF2-40B4-BE49-F238E27FC236}">
                 <a16:creationId xmlns:a16="http://schemas.microsoft.com/office/drawing/2014/main" id="{EE4E9A1B-D763-E44B-90B8-85232F967D28}"/>
               </a:ext>
             </a:extLst>
@@ -3793,7 +4019,28 @@
           <a:bodyPr/>
           <a:lstStyle/>
           <a:p>
-            <a:endParaRPr lang="en-US"/>
+            <a:r>
+              <a:rPr lang="en-US" dirty="0"/>
+              <a:t>Run code more</a:t>
+            </a:r>
+          </a:p>
+          <a:p>
+            <a:r>
+              <a:rPr lang="en-US" dirty="0"/>
+              <a:t>Extend </a:t>
+            </a:r>
+            <a:r>
+              <a:rPr lang="en-US" dirty="0" err="1"/>
+              <a:t>move_points</a:t>
+            </a:r>
+            <a:r>
+              <a:rPr lang="en-US" dirty="0"/>
+              <a:t> function to </a:t>
+            </a:r>
+            <a:r>
+              <a:rPr lang="en-US"/>
+              <a:t>more points </a:t>
+            </a:r>
           </a:p>
         </p:txBody>
       </p:sp>

</xml_diff>

<commit_message>
worked on moving_points file
</commit_message>
<xml_diff>
--- a/Weekly Presentations/Week 7.pptx
+++ b/Weekly Presentations/Week 7.pptx
@@ -265,7 +265,7 @@
           <a:p>
             <a:fld id="{691666CB-76B6-664D-9487-F1496474E9C0}" type="datetimeFigureOut">
               <a:rPr lang="en-US" smtClean="0"/>
-              <a:t>10/15/20</a:t>
+              <a:t>10/16/20</a:t>
             </a:fld>
             <a:endParaRPr lang="en-US"/>
           </a:p>
@@ -463,7 +463,7 @@
           <a:p>
             <a:fld id="{691666CB-76B6-664D-9487-F1496474E9C0}" type="datetimeFigureOut">
               <a:rPr lang="en-US" smtClean="0"/>
-              <a:t>10/15/20</a:t>
+              <a:t>10/16/20</a:t>
             </a:fld>
             <a:endParaRPr lang="en-US"/>
           </a:p>
@@ -671,7 +671,7 @@
           <a:p>
             <a:fld id="{691666CB-76B6-664D-9487-F1496474E9C0}" type="datetimeFigureOut">
               <a:rPr lang="en-US" smtClean="0"/>
-              <a:t>10/15/20</a:t>
+              <a:t>10/16/20</a:t>
             </a:fld>
             <a:endParaRPr lang="en-US"/>
           </a:p>
@@ -869,7 +869,7 @@
           <a:p>
             <a:fld id="{691666CB-76B6-664D-9487-F1496474E9C0}" type="datetimeFigureOut">
               <a:rPr lang="en-US" smtClean="0"/>
-              <a:t>10/15/20</a:t>
+              <a:t>10/16/20</a:t>
             </a:fld>
             <a:endParaRPr lang="en-US"/>
           </a:p>
@@ -1144,7 +1144,7 @@
           <a:p>
             <a:fld id="{691666CB-76B6-664D-9487-F1496474E9C0}" type="datetimeFigureOut">
               <a:rPr lang="en-US" smtClean="0"/>
-              <a:t>10/15/20</a:t>
+              <a:t>10/16/20</a:t>
             </a:fld>
             <a:endParaRPr lang="en-US"/>
           </a:p>
@@ -1409,7 +1409,7 @@
           <a:p>
             <a:fld id="{691666CB-76B6-664D-9487-F1496474E9C0}" type="datetimeFigureOut">
               <a:rPr lang="en-US" smtClean="0"/>
-              <a:t>10/15/20</a:t>
+              <a:t>10/16/20</a:t>
             </a:fld>
             <a:endParaRPr lang="en-US"/>
           </a:p>
@@ -1821,7 +1821,7 @@
           <a:p>
             <a:fld id="{691666CB-76B6-664D-9487-F1496474E9C0}" type="datetimeFigureOut">
               <a:rPr lang="en-US" smtClean="0"/>
-              <a:t>10/15/20</a:t>
+              <a:t>10/16/20</a:t>
             </a:fld>
             <a:endParaRPr lang="en-US"/>
           </a:p>
@@ -1962,7 +1962,7 @@
           <a:p>
             <a:fld id="{691666CB-76B6-664D-9487-F1496474E9C0}" type="datetimeFigureOut">
               <a:rPr lang="en-US" smtClean="0"/>
-              <a:t>10/15/20</a:t>
+              <a:t>10/16/20</a:t>
             </a:fld>
             <a:endParaRPr lang="en-US"/>
           </a:p>
@@ -2075,7 +2075,7 @@
           <a:p>
             <a:fld id="{691666CB-76B6-664D-9487-F1496474E9C0}" type="datetimeFigureOut">
               <a:rPr lang="en-US" smtClean="0"/>
-              <a:t>10/15/20</a:t>
+              <a:t>10/16/20</a:t>
             </a:fld>
             <a:endParaRPr lang="en-US"/>
           </a:p>
@@ -2386,7 +2386,7 @@
           <a:p>
             <a:fld id="{691666CB-76B6-664D-9487-F1496474E9C0}" type="datetimeFigureOut">
               <a:rPr lang="en-US" smtClean="0"/>
-              <a:t>10/15/20</a:t>
+              <a:t>10/16/20</a:t>
             </a:fld>
             <a:endParaRPr lang="en-US"/>
           </a:p>
@@ -2674,7 +2674,7 @@
           <a:p>
             <a:fld id="{691666CB-76B6-664D-9487-F1496474E9C0}" type="datetimeFigureOut">
               <a:rPr lang="en-US" smtClean="0"/>
-              <a:t>10/15/20</a:t>
+              <a:t>10/16/20</a:t>
             </a:fld>
             <a:endParaRPr lang="en-US"/>
           </a:p>
@@ -2915,7 +2915,7 @@
           <a:p>
             <a:fld id="{691666CB-76B6-664D-9487-F1496474E9C0}" type="datetimeFigureOut">
               <a:rPr lang="en-US" smtClean="0"/>
-              <a:t>10/15/20</a:t>
+              <a:t>10/16/20</a:t>
             </a:fld>
             <a:endParaRPr lang="en-US"/>
           </a:p>
@@ -3491,14 +3491,14 @@
             <a:pPr lvl="1"/>
             <a:r>
               <a:rPr lang="en-US" dirty="0"/>
-              <a:t>Since these results differed, I decided to run it for 10000 simulations. This has been running for 5 days :/</a:t>
+              <a:t>Since these results differed, I decided to run it for 10000 simulations. This has been running for 5 days – I think it timed out because now isn’t showing up :/</a:t>
             </a:r>
           </a:p>
           <a:p>
             <a:pPr lvl="1"/>
             <a:r>
               <a:rPr lang="en-US" dirty="0"/>
-              <a:t>Instead of running it for a set number of simulations, I decided to change it to run until the number of shots that hits the backboard exceeds a certain number. This way I can get a better sense of how many of the simulations are actually significant. (This code was still running Thursday night when I made the presentation)</a:t>
+              <a:t>Instead of running it for a set number of simulations, I decided to change it to run until the number of shots that hits the backboard exceeds a certain number. This way I can get a better sense of how many of the simulations are actually significant. (This code was still running Thursday night when I made the presentation) – getting this error message now</a:t>
             </a:r>
           </a:p>
         </p:txBody>
@@ -3646,8 +3646,8 @@
         </p:blipFill>
         <p:spPr>
           <a:xfrm>
-            <a:off x="7015480" y="0"/>
-            <a:ext cx="5176520" cy="1325563"/>
+            <a:off x="-1003889" y="365125"/>
+            <a:ext cx="14199778" cy="3636169"/>
           </a:xfrm>
           <a:prstGeom prst="rect">
             <a:avLst/>

</xml_diff>